<commit_message>
Changes and Comments Common and Robot Lab 13 (Events)
</commit_message>
<xml_diff>
--- a/Recap/Recap_ARM_Cortex_PirminHerger_RaphaelKissling.pptx
+++ b/Recap/Recap_ARM_Cortex_PirminHerger_RaphaelKissling.pptx
@@ -182,7 +182,7 @@
           <a:noFill/>
           <a:extLst>
             <a:ext uri="{909E8E84-426E-40dd-AFC4-6F175D3DCCD1}">
-              <a14:hiddenFill xmlns="" xmlns:a14="http://schemas.microsoft.com/office/drawing/2010/main">
+              <a14:hiddenFill xmlns:a14="http://schemas.microsoft.com/office/drawing/2010/main" xmlns="">
                 <a:solidFill>
                   <a:srgbClr val="FFFFFF"/>
                 </a:solidFill>
@@ -241,7 +241,7 @@
             </a:ln>
             <a:extLst>
               <a:ext uri="{91240B29-F687-4f45-9708-019B960494DF}">
-                <a14:hiddenLine xmlns="" xmlns:a14="http://schemas.microsoft.com/office/drawing/2010/main" w="9525">
+                <a14:hiddenLine xmlns:a14="http://schemas.microsoft.com/office/drawing/2010/main" xmlns="" w="9525">
                   <a:solidFill>
                     <a:srgbClr val="000000"/>
                   </a:solidFill>
@@ -331,7 +331,7 @@
             </a:ln>
             <a:extLst>
               <a:ext uri="{91240B29-F687-4f45-9708-019B960494DF}">
-                <a14:hiddenLine xmlns="" xmlns:a14="http://schemas.microsoft.com/office/drawing/2010/main" w="9525">
+                <a14:hiddenLine xmlns:a14="http://schemas.microsoft.com/office/drawing/2010/main" xmlns="" w="9525">
                   <a:solidFill>
                     <a:srgbClr val="000000"/>
                   </a:solidFill>
@@ -421,7 +421,7 @@
             </a:ln>
             <a:extLst>
               <a:ext uri="{91240B29-F687-4f45-9708-019B960494DF}">
-                <a14:hiddenLine xmlns="" xmlns:a14="http://schemas.microsoft.com/office/drawing/2010/main" w="9525">
+                <a14:hiddenLine xmlns:a14="http://schemas.microsoft.com/office/drawing/2010/main" xmlns="" w="9525">
                   <a:solidFill>
                     <a:srgbClr val="000000"/>
                   </a:solidFill>
@@ -455,7 +455,7 @@
             </a:ln>
             <a:extLst>
               <a:ext uri="{91240B29-F687-4f45-9708-019B960494DF}">
-                <a14:hiddenLine xmlns="" xmlns:a14="http://schemas.microsoft.com/office/drawing/2010/main" w="9525">
+                <a14:hiddenLine xmlns:a14="http://schemas.microsoft.com/office/drawing/2010/main" xmlns="" w="9525">
                   <a:solidFill>
                     <a:srgbClr val="000000"/>
                   </a:solidFill>
@@ -545,7 +545,7 @@
             </a:ln>
             <a:extLst>
               <a:ext uri="{91240B29-F687-4f45-9708-019B960494DF}">
-                <a14:hiddenLine xmlns="" xmlns:a14="http://schemas.microsoft.com/office/drawing/2010/main" w="9525">
+                <a14:hiddenLine xmlns:a14="http://schemas.microsoft.com/office/drawing/2010/main" xmlns="" w="9525">
                   <a:solidFill>
                     <a:srgbClr val="000000"/>
                   </a:solidFill>
@@ -607,7 +607,7 @@
             </a:ln>
             <a:extLst>
               <a:ext uri="{91240B29-F687-4f45-9708-019B960494DF}">
-                <a14:hiddenLine xmlns="" xmlns:a14="http://schemas.microsoft.com/office/drawing/2010/main" w="9525">
+                <a14:hiddenLine xmlns:a14="http://schemas.microsoft.com/office/drawing/2010/main" xmlns="" w="9525">
                   <a:solidFill>
                     <a:srgbClr val="000000"/>
                   </a:solidFill>
@@ -669,7 +669,7 @@
             </a:ln>
             <a:extLst>
               <a:ext uri="{91240B29-F687-4f45-9708-019B960494DF}">
-                <a14:hiddenLine xmlns="" xmlns:a14="http://schemas.microsoft.com/office/drawing/2010/main" w="9525">
+                <a14:hiddenLine xmlns:a14="http://schemas.microsoft.com/office/drawing/2010/main" xmlns="" w="9525">
                   <a:solidFill>
                     <a:srgbClr val="000000"/>
                   </a:solidFill>
@@ -759,7 +759,7 @@
             </a:ln>
             <a:extLst>
               <a:ext uri="{91240B29-F687-4f45-9708-019B960494DF}">
-                <a14:hiddenLine xmlns="" xmlns:a14="http://schemas.microsoft.com/office/drawing/2010/main" w="9525">
+                <a14:hiddenLine xmlns:a14="http://schemas.microsoft.com/office/drawing/2010/main" xmlns="" w="9525">
                   <a:solidFill>
                     <a:srgbClr val="000000"/>
                   </a:solidFill>
@@ -821,7 +821,7 @@
             </a:ln>
             <a:extLst>
               <a:ext uri="{91240B29-F687-4f45-9708-019B960494DF}">
-                <a14:hiddenLine xmlns="" xmlns:a14="http://schemas.microsoft.com/office/drawing/2010/main" w="9525">
+                <a14:hiddenLine xmlns:a14="http://schemas.microsoft.com/office/drawing/2010/main" xmlns="" w="9525">
                   <a:solidFill>
                     <a:srgbClr val="000000"/>
                   </a:solidFill>
@@ -883,7 +883,7 @@
             </a:ln>
             <a:extLst>
               <a:ext uri="{91240B29-F687-4f45-9708-019B960494DF}">
-                <a14:hiddenLine xmlns="" xmlns:a14="http://schemas.microsoft.com/office/drawing/2010/main" w="9525">
+                <a14:hiddenLine xmlns:a14="http://schemas.microsoft.com/office/drawing/2010/main" xmlns="" w="9525">
                   <a:solidFill>
                     <a:srgbClr val="000000"/>
                   </a:solidFill>
@@ -973,7 +973,7 @@
             </a:ln>
             <a:extLst>
               <a:ext uri="{91240B29-F687-4f45-9708-019B960494DF}">
-                <a14:hiddenLine xmlns="" xmlns:a14="http://schemas.microsoft.com/office/drawing/2010/main" w="9525">
+                <a14:hiddenLine xmlns:a14="http://schemas.microsoft.com/office/drawing/2010/main" xmlns="" w="9525">
                   <a:solidFill>
                     <a:srgbClr val="000000"/>
                   </a:solidFill>
@@ -1063,7 +1063,7 @@
             </a:ln>
             <a:extLst>
               <a:ext uri="{91240B29-F687-4f45-9708-019B960494DF}">
-                <a14:hiddenLine xmlns="" xmlns:a14="http://schemas.microsoft.com/office/drawing/2010/main" w="9525">
+                <a14:hiddenLine xmlns:a14="http://schemas.microsoft.com/office/drawing/2010/main" xmlns="" w="9525">
                   <a:solidFill>
                     <a:srgbClr val="000000"/>
                   </a:solidFill>
@@ -1125,7 +1125,7 @@
             </a:ln>
             <a:extLst>
               <a:ext uri="{91240B29-F687-4f45-9708-019B960494DF}">
-                <a14:hiddenLine xmlns="" xmlns:a14="http://schemas.microsoft.com/office/drawing/2010/main" w="9525">
+                <a14:hiddenLine xmlns:a14="http://schemas.microsoft.com/office/drawing/2010/main" xmlns="" w="9525">
                   <a:solidFill>
                     <a:srgbClr val="000000"/>
                   </a:solidFill>
@@ -1235,7 +1235,7 @@
             </a:ln>
             <a:extLst>
               <a:ext uri="{91240B29-F687-4f45-9708-019B960494DF}">
-                <a14:hiddenLine xmlns="" xmlns:a14="http://schemas.microsoft.com/office/drawing/2010/main" w="9525">
+                <a14:hiddenLine xmlns:a14="http://schemas.microsoft.com/office/drawing/2010/main" xmlns="" w="9525">
                   <a:solidFill>
                     <a:srgbClr val="000000"/>
                   </a:solidFill>
@@ -1297,7 +1297,7 @@
             </a:ln>
             <a:extLst>
               <a:ext uri="{91240B29-F687-4f45-9708-019B960494DF}">
-                <a14:hiddenLine xmlns="" xmlns:a14="http://schemas.microsoft.com/office/drawing/2010/main" w="9525">
+                <a14:hiddenLine xmlns:a14="http://schemas.microsoft.com/office/drawing/2010/main" xmlns="" w="9525">
                   <a:solidFill>
                     <a:srgbClr val="000000"/>
                   </a:solidFill>
@@ -1387,7 +1387,7 @@
             </a:ln>
             <a:extLst>
               <a:ext uri="{91240B29-F687-4f45-9708-019B960494DF}">
-                <a14:hiddenLine xmlns="" xmlns:a14="http://schemas.microsoft.com/office/drawing/2010/main" w="9525">
+                <a14:hiddenLine xmlns:a14="http://schemas.microsoft.com/office/drawing/2010/main" xmlns="" w="9525">
                   <a:solidFill>
                     <a:srgbClr val="000000"/>
                   </a:solidFill>
@@ -1477,7 +1477,7 @@
             </a:ln>
             <a:extLst>
               <a:ext uri="{91240B29-F687-4f45-9708-019B960494DF}">
-                <a14:hiddenLine xmlns="" xmlns:a14="http://schemas.microsoft.com/office/drawing/2010/main" w="9525">
+                <a14:hiddenLine xmlns:a14="http://schemas.microsoft.com/office/drawing/2010/main" xmlns="" w="9525">
                   <a:solidFill>
                     <a:srgbClr val="000000"/>
                   </a:solidFill>
@@ -1539,7 +1539,7 @@
             </a:ln>
             <a:extLst>
               <a:ext uri="{91240B29-F687-4f45-9708-019B960494DF}">
-                <a14:hiddenLine xmlns="" xmlns:a14="http://schemas.microsoft.com/office/drawing/2010/main" w="9525">
+                <a14:hiddenLine xmlns:a14="http://schemas.microsoft.com/office/drawing/2010/main" xmlns="" w="9525">
                   <a:solidFill>
                     <a:srgbClr val="000000"/>
                   </a:solidFill>
@@ -1629,7 +1629,7 @@
             </a:ln>
             <a:extLst>
               <a:ext uri="{91240B29-F687-4f45-9708-019B960494DF}">
-                <a14:hiddenLine xmlns="" xmlns:a14="http://schemas.microsoft.com/office/drawing/2010/main" w="9525">
+                <a14:hiddenLine xmlns:a14="http://schemas.microsoft.com/office/drawing/2010/main" xmlns="" w="9525">
                   <a:solidFill>
                     <a:srgbClr val="000000"/>
                   </a:solidFill>
@@ -1719,7 +1719,7 @@
             </a:ln>
             <a:extLst>
               <a:ext uri="{91240B29-F687-4f45-9708-019B960494DF}">
-                <a14:hiddenLine xmlns="" xmlns:a14="http://schemas.microsoft.com/office/drawing/2010/main" w="9525">
+                <a14:hiddenLine xmlns:a14="http://schemas.microsoft.com/office/drawing/2010/main" xmlns="" w="9525">
                   <a:solidFill>
                     <a:srgbClr val="000000"/>
                   </a:solidFill>
@@ -1775,7 +1775,7 @@
             </a:ln>
             <a:extLst>
               <a:ext uri="{91240B29-F687-4f45-9708-019B960494DF}">
-                <a14:hiddenLine xmlns="" xmlns:a14="http://schemas.microsoft.com/office/drawing/2010/main" w="9525">
+                <a14:hiddenLine xmlns:a14="http://schemas.microsoft.com/office/drawing/2010/main" xmlns="" w="9525">
                   <a:solidFill>
                     <a:srgbClr val="000000"/>
                   </a:solidFill>
@@ -1865,7 +1865,7 @@
             </a:ln>
             <a:extLst>
               <a:ext uri="{91240B29-F687-4f45-9708-019B960494DF}">
-                <a14:hiddenLine xmlns="" xmlns:a14="http://schemas.microsoft.com/office/drawing/2010/main" w="9525">
+                <a14:hiddenLine xmlns:a14="http://schemas.microsoft.com/office/drawing/2010/main" xmlns="" w="9525">
                   <a:solidFill>
                     <a:srgbClr val="000000"/>
                   </a:solidFill>
@@ -1921,7 +1921,7 @@
             </a:ln>
             <a:extLst>
               <a:ext uri="{91240B29-F687-4f45-9708-019B960494DF}">
-                <a14:hiddenLine xmlns="" xmlns:a14="http://schemas.microsoft.com/office/drawing/2010/main" w="9525">
+                <a14:hiddenLine xmlns:a14="http://schemas.microsoft.com/office/drawing/2010/main" xmlns="" w="9525">
                   <a:solidFill>
                     <a:srgbClr val="000000"/>
                   </a:solidFill>
@@ -2011,7 +2011,7 @@
             </a:ln>
             <a:extLst>
               <a:ext uri="{91240B29-F687-4f45-9708-019B960494DF}">
-                <a14:hiddenLine xmlns="" xmlns:a14="http://schemas.microsoft.com/office/drawing/2010/main" w="9525">
+                <a14:hiddenLine xmlns:a14="http://schemas.microsoft.com/office/drawing/2010/main" xmlns="" w="9525">
                   <a:solidFill>
                     <a:srgbClr val="000000"/>
                   </a:solidFill>
@@ -2079,7 +2079,7 @@
             </a:ln>
             <a:extLst>
               <a:ext uri="{91240B29-F687-4f45-9708-019B960494DF}">
-                <a14:hiddenLine xmlns="" xmlns:a14="http://schemas.microsoft.com/office/drawing/2010/main" w="9525">
+                <a14:hiddenLine xmlns:a14="http://schemas.microsoft.com/office/drawing/2010/main" xmlns="" w="9525">
                   <a:solidFill>
                     <a:srgbClr val="000000"/>
                   </a:solidFill>
@@ -2169,7 +2169,7 @@
             </a:ln>
             <a:extLst>
               <a:ext uri="{91240B29-F687-4f45-9708-019B960494DF}">
-                <a14:hiddenLine xmlns="" xmlns:a14="http://schemas.microsoft.com/office/drawing/2010/main" w="9525">
+                <a14:hiddenLine xmlns:a14="http://schemas.microsoft.com/office/drawing/2010/main" xmlns="" w="9525">
                   <a:solidFill>
                     <a:srgbClr val="000000"/>
                   </a:solidFill>
@@ -2237,7 +2237,7 @@
             </a:ln>
             <a:extLst>
               <a:ext uri="{91240B29-F687-4f45-9708-019B960494DF}">
-                <a14:hiddenLine xmlns="" xmlns:a14="http://schemas.microsoft.com/office/drawing/2010/main" w="9525">
+                <a14:hiddenLine xmlns:a14="http://schemas.microsoft.com/office/drawing/2010/main" xmlns="" w="9525">
                   <a:solidFill>
                     <a:srgbClr val="000000"/>
                   </a:solidFill>
@@ -2327,7 +2327,7 @@
             </a:ln>
             <a:extLst>
               <a:ext uri="{91240B29-F687-4f45-9708-019B960494DF}">
-                <a14:hiddenLine xmlns="" xmlns:a14="http://schemas.microsoft.com/office/drawing/2010/main" w="9525">
+                <a14:hiddenLine xmlns:a14="http://schemas.microsoft.com/office/drawing/2010/main" xmlns="" w="9525">
                   <a:solidFill>
                     <a:srgbClr val="000000"/>
                   </a:solidFill>
@@ -2361,7 +2361,7 @@
             </a:ln>
             <a:extLst>
               <a:ext uri="{91240B29-F687-4f45-9708-019B960494DF}">
-                <a14:hiddenLine xmlns="" xmlns:a14="http://schemas.microsoft.com/office/drawing/2010/main" w="9525">
+                <a14:hiddenLine xmlns:a14="http://schemas.microsoft.com/office/drawing/2010/main" xmlns="" w="9525">
                   <a:solidFill>
                     <a:srgbClr val="000000"/>
                   </a:solidFill>
@@ -2451,7 +2451,7 @@
             </a:ln>
             <a:extLst>
               <a:ext uri="{91240B29-F687-4f45-9708-019B960494DF}">
-                <a14:hiddenLine xmlns="" xmlns:a14="http://schemas.microsoft.com/office/drawing/2010/main" w="9525">
+                <a14:hiddenLine xmlns:a14="http://schemas.microsoft.com/office/drawing/2010/main" xmlns="" w="9525">
                   <a:solidFill>
                     <a:srgbClr val="000000"/>
                   </a:solidFill>
@@ -2513,7 +2513,7 @@
             </a:ln>
             <a:extLst>
               <a:ext uri="{91240B29-F687-4f45-9708-019B960494DF}">
-                <a14:hiddenLine xmlns="" xmlns:a14="http://schemas.microsoft.com/office/drawing/2010/main" w="9525">
+                <a14:hiddenLine xmlns:a14="http://schemas.microsoft.com/office/drawing/2010/main" xmlns="" w="9525">
                   <a:solidFill>
                     <a:srgbClr val="000000"/>
                   </a:solidFill>
@@ -2575,7 +2575,7 @@
             </a:ln>
             <a:extLst>
               <a:ext uri="{91240B29-F687-4f45-9708-019B960494DF}">
-                <a14:hiddenLine xmlns="" xmlns:a14="http://schemas.microsoft.com/office/drawing/2010/main" w="9525">
+                <a14:hiddenLine xmlns:a14="http://schemas.microsoft.com/office/drawing/2010/main" xmlns="" w="9525">
                   <a:solidFill>
                     <a:srgbClr val="000000"/>
                   </a:solidFill>
@@ -2665,7 +2665,7 @@
             </a:ln>
             <a:extLst>
               <a:ext uri="{91240B29-F687-4f45-9708-019B960494DF}">
-                <a14:hiddenLine xmlns="" xmlns:a14="http://schemas.microsoft.com/office/drawing/2010/main" w="9525">
+                <a14:hiddenLine xmlns:a14="http://schemas.microsoft.com/office/drawing/2010/main" xmlns="" w="9525">
                   <a:solidFill>
                     <a:srgbClr val="000000"/>
                   </a:solidFill>
@@ -2733,7 +2733,7 @@
             </a:ln>
             <a:extLst>
               <a:ext uri="{91240B29-F687-4f45-9708-019B960494DF}">
-                <a14:hiddenLine xmlns="" xmlns:a14="http://schemas.microsoft.com/office/drawing/2010/main" w="9525">
+                <a14:hiddenLine xmlns:a14="http://schemas.microsoft.com/office/drawing/2010/main" xmlns="" w="9525">
                   <a:solidFill>
                     <a:srgbClr val="000000"/>
                   </a:solidFill>
@@ -2795,7 +2795,7 @@
             </a:ln>
             <a:extLst>
               <a:ext uri="{91240B29-F687-4f45-9708-019B960494DF}">
-                <a14:hiddenLine xmlns="" xmlns:a14="http://schemas.microsoft.com/office/drawing/2010/main" w="9525">
+                <a14:hiddenLine xmlns:a14="http://schemas.microsoft.com/office/drawing/2010/main" xmlns="" w="9525">
                   <a:solidFill>
                     <a:srgbClr val="000000"/>
                   </a:solidFill>
@@ -2885,7 +2885,7 @@
             </a:ln>
             <a:extLst>
               <a:ext uri="{91240B29-F687-4f45-9708-019B960494DF}">
-                <a14:hiddenLine xmlns="" xmlns:a14="http://schemas.microsoft.com/office/drawing/2010/main" w="9525">
+                <a14:hiddenLine xmlns:a14="http://schemas.microsoft.com/office/drawing/2010/main" xmlns="" w="9525">
                   <a:solidFill>
                     <a:srgbClr val="000000"/>
                   </a:solidFill>
@@ -2947,7 +2947,7 @@
             </a:ln>
             <a:extLst>
               <a:ext uri="{91240B29-F687-4f45-9708-019B960494DF}">
-                <a14:hiddenLine xmlns="" xmlns:a14="http://schemas.microsoft.com/office/drawing/2010/main" w="9525">
+                <a14:hiddenLine xmlns:a14="http://schemas.microsoft.com/office/drawing/2010/main" xmlns="" w="9525">
                   <a:solidFill>
                     <a:srgbClr val="000000"/>
                   </a:solidFill>
@@ -3037,7 +3037,7 @@
             </a:ln>
             <a:extLst>
               <a:ext uri="{91240B29-F687-4f45-9708-019B960494DF}">
-                <a14:hiddenLine xmlns="" xmlns:a14="http://schemas.microsoft.com/office/drawing/2010/main" w="9525">
+                <a14:hiddenLine xmlns:a14="http://schemas.microsoft.com/office/drawing/2010/main" xmlns="" w="9525">
                   <a:solidFill>
                     <a:srgbClr val="000000"/>
                   </a:solidFill>
@@ -3099,7 +3099,7 @@
             </a:ln>
             <a:extLst>
               <a:ext uri="{91240B29-F687-4f45-9708-019B960494DF}">
-                <a14:hiddenLine xmlns="" xmlns:a14="http://schemas.microsoft.com/office/drawing/2010/main" w="9525">
+                <a14:hiddenLine xmlns:a14="http://schemas.microsoft.com/office/drawing/2010/main" xmlns="" w="9525">
                   <a:solidFill>
                     <a:srgbClr val="000000"/>
                   </a:solidFill>
@@ -3189,7 +3189,7 @@
             </a:ln>
             <a:extLst>
               <a:ext uri="{91240B29-F687-4f45-9708-019B960494DF}">
-                <a14:hiddenLine xmlns="" xmlns:a14="http://schemas.microsoft.com/office/drawing/2010/main" w="9525">
+                <a14:hiddenLine xmlns:a14="http://schemas.microsoft.com/office/drawing/2010/main" xmlns="" w="9525">
                   <a:solidFill>
                     <a:srgbClr val="000000"/>
                   </a:solidFill>
@@ -3223,7 +3223,7 @@
             </a:ln>
             <a:extLst>
               <a:ext uri="{91240B29-F687-4f45-9708-019B960494DF}">
-                <a14:hiddenLine xmlns="" xmlns:a14="http://schemas.microsoft.com/office/drawing/2010/main" w="9525">
+                <a14:hiddenLine xmlns:a14="http://schemas.microsoft.com/office/drawing/2010/main" xmlns="" w="9525">
                   <a:solidFill>
                     <a:srgbClr val="000000"/>
                   </a:solidFill>
@@ -3288,7 +3288,7 @@
             </a:ln>
             <a:extLst>
               <a:ext uri="{91240B29-F687-4f45-9708-019B960494DF}">
-                <a14:hiddenLine xmlns="" xmlns:a14="http://schemas.microsoft.com/office/drawing/2010/main" w="9525">
+                <a14:hiddenLine xmlns:a14="http://schemas.microsoft.com/office/drawing/2010/main" xmlns="" w="9525">
                   <a:solidFill>
                     <a:srgbClr val="000000"/>
                   </a:solidFill>
@@ -3378,7 +3378,7 @@
             </a:ln>
             <a:extLst>
               <a:ext uri="{91240B29-F687-4f45-9708-019B960494DF}">
-                <a14:hiddenLine xmlns="" xmlns:a14="http://schemas.microsoft.com/office/drawing/2010/main" w="9525">
+                <a14:hiddenLine xmlns:a14="http://schemas.microsoft.com/office/drawing/2010/main" xmlns="" w="9525">
                   <a:solidFill>
                     <a:srgbClr val="000000"/>
                   </a:solidFill>
@@ -3440,7 +3440,7 @@
             </a:ln>
             <a:extLst>
               <a:ext uri="{91240B29-F687-4f45-9708-019B960494DF}">
-                <a14:hiddenLine xmlns="" xmlns:a14="http://schemas.microsoft.com/office/drawing/2010/main" w="9525">
+                <a14:hiddenLine xmlns:a14="http://schemas.microsoft.com/office/drawing/2010/main" xmlns="" w="9525">
                   <a:solidFill>
                     <a:srgbClr val="000000"/>
                   </a:solidFill>
@@ -3530,7 +3530,7 @@
             </a:ln>
             <a:extLst>
               <a:ext uri="{91240B29-F687-4f45-9708-019B960494DF}">
-                <a14:hiddenLine xmlns="" xmlns:a14="http://schemas.microsoft.com/office/drawing/2010/main" w="9525">
+                <a14:hiddenLine xmlns:a14="http://schemas.microsoft.com/office/drawing/2010/main" xmlns="" w="9525">
                   <a:solidFill>
                     <a:srgbClr val="000000"/>
                   </a:solidFill>
@@ -3620,7 +3620,7 @@
             </a:ln>
             <a:extLst>
               <a:ext uri="{91240B29-F687-4f45-9708-019B960494DF}">
-                <a14:hiddenLine xmlns="" xmlns:a14="http://schemas.microsoft.com/office/drawing/2010/main" w="9525">
+                <a14:hiddenLine xmlns:a14="http://schemas.microsoft.com/office/drawing/2010/main" xmlns="" w="9525">
                   <a:solidFill>
                     <a:srgbClr val="000000"/>
                   </a:solidFill>
@@ -3685,7 +3685,7 @@
             </a:ln>
             <a:extLst>
               <a:ext uri="{91240B29-F687-4f45-9708-019B960494DF}">
-                <a14:hiddenLine xmlns="" xmlns:a14="http://schemas.microsoft.com/office/drawing/2010/main" w="9525">
+                <a14:hiddenLine xmlns:a14="http://schemas.microsoft.com/office/drawing/2010/main" xmlns="" w="9525">
                   <a:solidFill>
                     <a:srgbClr val="000000"/>
                   </a:solidFill>
@@ -3747,7 +3747,7 @@
             </a:ln>
             <a:extLst>
               <a:ext uri="{91240B29-F687-4f45-9708-019B960494DF}">
-                <a14:hiddenLine xmlns="" xmlns:a14="http://schemas.microsoft.com/office/drawing/2010/main" w="9525">
+                <a14:hiddenLine xmlns:a14="http://schemas.microsoft.com/office/drawing/2010/main" xmlns="" w="9525">
                   <a:solidFill>
                     <a:srgbClr val="000000"/>
                   </a:solidFill>
@@ -3837,7 +3837,7 @@
             </a:ln>
             <a:extLst>
               <a:ext uri="{91240B29-F687-4f45-9708-019B960494DF}">
-                <a14:hiddenLine xmlns="" xmlns:a14="http://schemas.microsoft.com/office/drawing/2010/main" w="9525">
+                <a14:hiddenLine xmlns:a14="http://schemas.microsoft.com/office/drawing/2010/main" xmlns="" w="9525">
                   <a:solidFill>
                     <a:srgbClr val="000000"/>
                   </a:solidFill>
@@ -3927,7 +3927,7 @@
             </a:ln>
             <a:extLst>
               <a:ext uri="{91240B29-F687-4f45-9708-019B960494DF}">
-                <a14:hiddenLine xmlns="" xmlns:a14="http://schemas.microsoft.com/office/drawing/2010/main" w="9525">
+                <a14:hiddenLine xmlns:a14="http://schemas.microsoft.com/office/drawing/2010/main" xmlns="" w="9525">
                   <a:solidFill>
                     <a:srgbClr val="000000"/>
                   </a:solidFill>
@@ -3989,7 +3989,7 @@
             </a:ln>
             <a:extLst>
               <a:ext uri="{91240B29-F687-4f45-9708-019B960494DF}">
-                <a14:hiddenLine xmlns="" xmlns:a14="http://schemas.microsoft.com/office/drawing/2010/main" w="9525">
+                <a14:hiddenLine xmlns:a14="http://schemas.microsoft.com/office/drawing/2010/main" xmlns="" w="9525">
                   <a:solidFill>
                     <a:srgbClr val="000000"/>
                   </a:solidFill>
@@ -4109,7 +4109,7 @@
             </a:ln>
             <a:extLst>
               <a:ext uri="{91240B29-F687-4f45-9708-019B960494DF}">
-                <a14:hiddenLine xmlns="" xmlns:a14="http://schemas.microsoft.com/office/drawing/2010/main" w="9525">
+                <a14:hiddenLine xmlns:a14="http://schemas.microsoft.com/office/drawing/2010/main" xmlns="" w="9525">
                   <a:solidFill>
                     <a:srgbClr val="000000"/>
                   </a:solidFill>
@@ -4177,7 +4177,7 @@
             </a:ln>
             <a:extLst>
               <a:ext uri="{91240B29-F687-4f45-9708-019B960494DF}">
-                <a14:hiddenLine xmlns="" xmlns:a14="http://schemas.microsoft.com/office/drawing/2010/main" w="9525">
+                <a14:hiddenLine xmlns:a14="http://schemas.microsoft.com/office/drawing/2010/main" xmlns="" w="9525">
                   <a:solidFill>
                     <a:srgbClr val="000000"/>
                   </a:solidFill>
@@ -4267,7 +4267,7 @@
             </a:ln>
             <a:extLst>
               <a:ext uri="{91240B29-F687-4f45-9708-019B960494DF}">
-                <a14:hiddenLine xmlns="" xmlns:a14="http://schemas.microsoft.com/office/drawing/2010/main" w="9525">
+                <a14:hiddenLine xmlns:a14="http://schemas.microsoft.com/office/drawing/2010/main" xmlns="" w="9525">
                   <a:solidFill>
                     <a:srgbClr val="000000"/>
                   </a:solidFill>
@@ -8996,7 +8996,7 @@
           <a:noFill/>
           <a:extLst>
             <a:ext uri="{909E8E84-426E-40dd-AFC4-6F175D3DCCD1}">
-              <a14:hiddenFill xmlns="" xmlns:a14="http://schemas.microsoft.com/office/drawing/2010/main">
+              <a14:hiddenFill xmlns:a14="http://schemas.microsoft.com/office/drawing/2010/main" xmlns="">
                 <a:solidFill>
                   <a:srgbClr val="FFFFFF"/>
                 </a:solidFill>
@@ -9070,7 +9070,7 @@
               </a:ln>
               <a:extLst>
                 <a:ext uri="{91240B29-F687-4f45-9708-019B960494DF}">
-                  <a14:hiddenLine xmlns="" xmlns:a14="http://schemas.microsoft.com/office/drawing/2010/main" w="9525">
+                  <a14:hiddenLine xmlns:a14="http://schemas.microsoft.com/office/drawing/2010/main" xmlns="" w="9525">
                     <a:solidFill>
                       <a:srgbClr val="000000"/>
                     </a:solidFill>
@@ -9160,7 +9160,7 @@
               </a:ln>
               <a:extLst>
                 <a:ext uri="{91240B29-F687-4f45-9708-019B960494DF}">
-                  <a14:hiddenLine xmlns="" xmlns:a14="http://schemas.microsoft.com/office/drawing/2010/main" w="9525">
+                  <a14:hiddenLine xmlns:a14="http://schemas.microsoft.com/office/drawing/2010/main" xmlns="" w="9525">
                     <a:solidFill>
                       <a:srgbClr val="000000"/>
                     </a:solidFill>
@@ -9250,7 +9250,7 @@
               </a:ln>
               <a:extLst>
                 <a:ext uri="{91240B29-F687-4f45-9708-019B960494DF}">
-                  <a14:hiddenLine xmlns="" xmlns:a14="http://schemas.microsoft.com/office/drawing/2010/main" w="9525">
+                  <a14:hiddenLine xmlns:a14="http://schemas.microsoft.com/office/drawing/2010/main" xmlns="" w="9525">
                     <a:solidFill>
                       <a:srgbClr val="000000"/>
                     </a:solidFill>
@@ -9312,7 +9312,7 @@
               </a:ln>
               <a:extLst>
                 <a:ext uri="{91240B29-F687-4f45-9708-019B960494DF}">
-                  <a14:hiddenLine xmlns="" xmlns:a14="http://schemas.microsoft.com/office/drawing/2010/main" w="9525">
+                  <a14:hiddenLine xmlns:a14="http://schemas.microsoft.com/office/drawing/2010/main" xmlns="" w="9525">
                     <a:solidFill>
                       <a:srgbClr val="000000"/>
                     </a:solidFill>
@@ -9402,7 +9402,7 @@
               </a:ln>
               <a:extLst>
                 <a:ext uri="{91240B29-F687-4f45-9708-019B960494DF}">
-                  <a14:hiddenLine xmlns="" xmlns:a14="http://schemas.microsoft.com/office/drawing/2010/main" w="9525">
+                  <a14:hiddenLine xmlns:a14="http://schemas.microsoft.com/office/drawing/2010/main" xmlns="" w="9525">
                     <a:solidFill>
                       <a:srgbClr val="000000"/>
                     </a:solidFill>
@@ -9464,7 +9464,7 @@
               </a:ln>
               <a:extLst>
                 <a:ext uri="{91240B29-F687-4f45-9708-019B960494DF}">
-                  <a14:hiddenLine xmlns="" xmlns:a14="http://schemas.microsoft.com/office/drawing/2010/main" w="9525">
+                  <a14:hiddenLine xmlns:a14="http://schemas.microsoft.com/office/drawing/2010/main" xmlns="" w="9525">
                     <a:solidFill>
                       <a:srgbClr val="000000"/>
                     </a:solidFill>
@@ -9526,7 +9526,7 @@
               </a:ln>
               <a:extLst>
                 <a:ext uri="{91240B29-F687-4f45-9708-019B960494DF}">
-                  <a14:hiddenLine xmlns="" xmlns:a14="http://schemas.microsoft.com/office/drawing/2010/main" w="9525">
+                  <a14:hiddenLine xmlns:a14="http://schemas.microsoft.com/office/drawing/2010/main" xmlns="" w="9525">
                     <a:solidFill>
                       <a:srgbClr val="000000"/>
                     </a:solidFill>
@@ -9616,7 +9616,7 @@
               </a:ln>
               <a:extLst>
                 <a:ext uri="{91240B29-F687-4f45-9708-019B960494DF}">
-                  <a14:hiddenLine xmlns="" xmlns:a14="http://schemas.microsoft.com/office/drawing/2010/main" w="9525">
+                  <a14:hiddenLine xmlns:a14="http://schemas.microsoft.com/office/drawing/2010/main" xmlns="" w="9525">
                     <a:solidFill>
                       <a:srgbClr val="000000"/>
                     </a:solidFill>
@@ -9706,7 +9706,7 @@
               </a:ln>
               <a:extLst>
                 <a:ext uri="{91240B29-F687-4f45-9708-019B960494DF}">
-                  <a14:hiddenLine xmlns="" xmlns:a14="http://schemas.microsoft.com/office/drawing/2010/main" w="9525">
+                  <a14:hiddenLine xmlns:a14="http://schemas.microsoft.com/office/drawing/2010/main" xmlns="" w="9525">
                     <a:solidFill>
                       <a:srgbClr val="000000"/>
                     </a:solidFill>
@@ -9768,7 +9768,7 @@
               </a:ln>
               <a:extLst>
                 <a:ext uri="{91240B29-F687-4f45-9708-019B960494DF}">
-                  <a14:hiddenLine xmlns="" xmlns:a14="http://schemas.microsoft.com/office/drawing/2010/main" w="9525">
+                  <a14:hiddenLine xmlns:a14="http://schemas.microsoft.com/office/drawing/2010/main" xmlns="" w="9525">
                     <a:solidFill>
                       <a:srgbClr val="000000"/>
                     </a:solidFill>
@@ -9878,7 +9878,7 @@
               </a:ln>
               <a:extLst>
                 <a:ext uri="{91240B29-F687-4f45-9708-019B960494DF}">
-                  <a14:hiddenLine xmlns="" xmlns:a14="http://schemas.microsoft.com/office/drawing/2010/main" w="9525">
+                  <a14:hiddenLine xmlns:a14="http://schemas.microsoft.com/office/drawing/2010/main" xmlns="" w="9525">
                     <a:solidFill>
                       <a:srgbClr val="000000"/>
                     </a:solidFill>
@@ -9962,7 +9962,7 @@
               </a:ln>
               <a:extLst>
                 <a:ext uri="{91240B29-F687-4f45-9708-019B960494DF}">
-                  <a14:hiddenLine xmlns="" xmlns:a14="http://schemas.microsoft.com/office/drawing/2010/main" w="9525">
+                  <a14:hiddenLine xmlns:a14="http://schemas.microsoft.com/office/drawing/2010/main" xmlns="" w="9525">
                     <a:solidFill>
                       <a:srgbClr val="000000"/>
                     </a:solidFill>
@@ -10024,7 +10024,7 @@
               </a:ln>
               <a:extLst>
                 <a:ext uri="{91240B29-F687-4f45-9708-019B960494DF}">
-                  <a14:hiddenLine xmlns="" xmlns:a14="http://schemas.microsoft.com/office/drawing/2010/main" w="9525">
+                  <a14:hiddenLine xmlns:a14="http://schemas.microsoft.com/office/drawing/2010/main" xmlns="" w="9525">
                     <a:solidFill>
                       <a:srgbClr val="000000"/>
                     </a:solidFill>
@@ -10086,7 +10086,7 @@
               </a:ln>
               <a:extLst>
                 <a:ext uri="{91240B29-F687-4f45-9708-019B960494DF}">
-                  <a14:hiddenLine xmlns="" xmlns:a14="http://schemas.microsoft.com/office/drawing/2010/main" w="9525">
+                  <a14:hiddenLine xmlns:a14="http://schemas.microsoft.com/office/drawing/2010/main" xmlns="" w="9525">
                     <a:solidFill>
                       <a:srgbClr val="000000"/>
                     </a:solidFill>
@@ -10176,7 +10176,7 @@
               </a:ln>
               <a:extLst>
                 <a:ext uri="{91240B29-F687-4f45-9708-019B960494DF}">
-                  <a14:hiddenLine xmlns="" xmlns:a14="http://schemas.microsoft.com/office/drawing/2010/main" w="9525">
+                  <a14:hiddenLine xmlns:a14="http://schemas.microsoft.com/office/drawing/2010/main" xmlns="" w="9525">
                     <a:solidFill>
                       <a:srgbClr val="000000"/>
                     </a:solidFill>
@@ -10210,7 +10210,7 @@
               </a:ln>
               <a:extLst>
                 <a:ext uri="{91240B29-F687-4f45-9708-019B960494DF}">
-                  <a14:hiddenLine xmlns="" xmlns:a14="http://schemas.microsoft.com/office/drawing/2010/main" w="9525">
+                  <a14:hiddenLine xmlns:a14="http://schemas.microsoft.com/office/drawing/2010/main" xmlns="" w="9525">
                     <a:solidFill>
                       <a:srgbClr val="000000"/>
                     </a:solidFill>
@@ -10275,7 +10275,7 @@
               </a:ln>
               <a:extLst>
                 <a:ext uri="{91240B29-F687-4f45-9708-019B960494DF}">
-                  <a14:hiddenLine xmlns="" xmlns:a14="http://schemas.microsoft.com/office/drawing/2010/main" w="9525">
+                  <a14:hiddenLine xmlns:a14="http://schemas.microsoft.com/office/drawing/2010/main" xmlns="" w="9525">
                     <a:solidFill>
                       <a:srgbClr val="000000"/>
                     </a:solidFill>
@@ -10365,7 +10365,7 @@
               </a:ln>
               <a:extLst>
                 <a:ext uri="{91240B29-F687-4f45-9708-019B960494DF}">
-                  <a14:hiddenLine xmlns="" xmlns:a14="http://schemas.microsoft.com/office/drawing/2010/main" w="9525">
+                  <a14:hiddenLine xmlns:a14="http://schemas.microsoft.com/office/drawing/2010/main" xmlns="" w="9525">
                     <a:solidFill>
                       <a:srgbClr val="000000"/>
                     </a:solidFill>
@@ -10427,7 +10427,7 @@
               </a:ln>
               <a:extLst>
                 <a:ext uri="{91240B29-F687-4f45-9708-019B960494DF}">
-                  <a14:hiddenLine xmlns="" xmlns:a14="http://schemas.microsoft.com/office/drawing/2010/main" w="9525">
+                  <a14:hiddenLine xmlns:a14="http://schemas.microsoft.com/office/drawing/2010/main" xmlns="" w="9525">
                     <a:solidFill>
                       <a:srgbClr val="000000"/>
                     </a:solidFill>
@@ -10517,7 +10517,7 @@
               </a:ln>
               <a:extLst>
                 <a:ext uri="{91240B29-F687-4f45-9708-019B960494DF}">
-                  <a14:hiddenLine xmlns="" xmlns:a14="http://schemas.microsoft.com/office/drawing/2010/main" w="9525">
+                  <a14:hiddenLine xmlns:a14="http://schemas.microsoft.com/office/drawing/2010/main" xmlns="" w="9525">
                     <a:solidFill>
                       <a:srgbClr val="000000"/>
                     </a:solidFill>
@@ -10582,7 +10582,7 @@
               </a:ln>
               <a:extLst>
                 <a:ext uri="{91240B29-F687-4f45-9708-019B960494DF}">
-                  <a14:hiddenLine xmlns="" xmlns:a14="http://schemas.microsoft.com/office/drawing/2010/main" w="9525">
+                  <a14:hiddenLine xmlns:a14="http://schemas.microsoft.com/office/drawing/2010/main" xmlns="" w="9525">
                     <a:solidFill>
                       <a:srgbClr val="000000"/>
                     </a:solidFill>
@@ -10644,7 +10644,7 @@
               </a:ln>
               <a:extLst>
                 <a:ext uri="{91240B29-F687-4f45-9708-019B960494DF}">
-                  <a14:hiddenLine xmlns="" xmlns:a14="http://schemas.microsoft.com/office/drawing/2010/main" w="9525">
+                  <a14:hiddenLine xmlns:a14="http://schemas.microsoft.com/office/drawing/2010/main" xmlns="" w="9525">
                     <a:solidFill>
                       <a:srgbClr val="000000"/>
                     </a:solidFill>
@@ -10734,7 +10734,7 @@
               </a:ln>
               <a:extLst>
                 <a:ext uri="{91240B29-F687-4f45-9708-019B960494DF}">
-                  <a14:hiddenLine xmlns="" xmlns:a14="http://schemas.microsoft.com/office/drawing/2010/main" w="9525">
+                  <a14:hiddenLine xmlns:a14="http://schemas.microsoft.com/office/drawing/2010/main" xmlns="" w="9525">
                     <a:solidFill>
                       <a:srgbClr val="000000"/>
                     </a:solidFill>
@@ -10824,7 +10824,7 @@
               </a:ln>
               <a:extLst>
                 <a:ext uri="{91240B29-F687-4f45-9708-019B960494DF}">
-                  <a14:hiddenLine xmlns="" xmlns:a14="http://schemas.microsoft.com/office/drawing/2010/main" w="9525">
+                  <a14:hiddenLine xmlns:a14="http://schemas.microsoft.com/office/drawing/2010/main" xmlns="" w="9525">
                     <a:solidFill>
                       <a:srgbClr val="000000"/>
                     </a:solidFill>
@@ -10889,7 +10889,7 @@
               </a:ln>
               <a:extLst>
                 <a:ext uri="{91240B29-F687-4f45-9708-019B960494DF}">
-                  <a14:hiddenLine xmlns="" xmlns:a14="http://schemas.microsoft.com/office/drawing/2010/main" w="9525">
+                  <a14:hiddenLine xmlns:a14="http://schemas.microsoft.com/office/drawing/2010/main" xmlns="" w="9525">
                     <a:solidFill>
                       <a:srgbClr val="000000"/>
                     </a:solidFill>
@@ -11009,7 +11009,7 @@
               </a:ln>
               <a:extLst>
                 <a:ext uri="{91240B29-F687-4f45-9708-019B960494DF}">
-                  <a14:hiddenLine xmlns="" xmlns:a14="http://schemas.microsoft.com/office/drawing/2010/main" w="9525">
+                  <a14:hiddenLine xmlns:a14="http://schemas.microsoft.com/office/drawing/2010/main" xmlns="" w="9525">
                     <a:solidFill>
                       <a:srgbClr val="000000"/>
                     </a:solidFill>
@@ -11090,7 +11090,7 @@
               </a:ln>
               <a:extLst>
                 <a:ext uri="{91240B29-F687-4f45-9708-019B960494DF}">
-                  <a14:hiddenLine xmlns="" xmlns:a14="http://schemas.microsoft.com/office/drawing/2010/main" w="9525">
+                  <a14:hiddenLine xmlns:a14="http://schemas.microsoft.com/office/drawing/2010/main" xmlns="" w="9525">
                     <a:solidFill>
                       <a:srgbClr val="000000"/>
                     </a:solidFill>
@@ -11205,7 +11205,7 @@
               </a:ln>
               <a:extLst>
                 <a:ext uri="{91240B29-F687-4f45-9708-019B960494DF}">
-                  <a14:hiddenLine xmlns="" xmlns:a14="http://schemas.microsoft.com/office/drawing/2010/main" w="9525">
+                  <a14:hiddenLine xmlns:a14="http://schemas.microsoft.com/office/drawing/2010/main" xmlns="" w="9525">
                     <a:solidFill>
                       <a:srgbClr val="000000"/>
                     </a:solidFill>
@@ -11295,7 +11295,7 @@
               </a:ln>
               <a:extLst>
                 <a:ext uri="{91240B29-F687-4f45-9708-019B960494DF}">
-                  <a14:hiddenLine xmlns="" xmlns:a14="http://schemas.microsoft.com/office/drawing/2010/main" w="9525">
+                  <a14:hiddenLine xmlns:a14="http://schemas.microsoft.com/office/drawing/2010/main" xmlns="" w="9525">
                     <a:solidFill>
                       <a:srgbClr val="000000"/>
                     </a:solidFill>
@@ -11360,7 +11360,7 @@
               </a:ln>
               <a:extLst>
                 <a:ext uri="{91240B29-F687-4f45-9708-019B960494DF}">
-                  <a14:hiddenLine xmlns="" xmlns:a14="http://schemas.microsoft.com/office/drawing/2010/main" w="9525">
+                  <a14:hiddenLine xmlns:a14="http://schemas.microsoft.com/office/drawing/2010/main" xmlns="" w="9525">
                     <a:solidFill>
                       <a:srgbClr val="000000"/>
                     </a:solidFill>
@@ -11450,7 +11450,7 @@
               </a:ln>
               <a:extLst>
                 <a:ext uri="{91240B29-F687-4f45-9708-019B960494DF}">
-                  <a14:hiddenLine xmlns="" xmlns:a14="http://schemas.microsoft.com/office/drawing/2010/main" w="9525">
+                  <a14:hiddenLine xmlns:a14="http://schemas.microsoft.com/office/drawing/2010/main" xmlns="" w="9525">
                     <a:solidFill>
                       <a:srgbClr val="000000"/>
                     </a:solidFill>
@@ -11518,7 +11518,7 @@
               </a:ln>
               <a:extLst>
                 <a:ext uri="{91240B29-F687-4f45-9708-019B960494DF}">
-                  <a14:hiddenLine xmlns="" xmlns:a14="http://schemas.microsoft.com/office/drawing/2010/main" w="9525">
+                  <a14:hiddenLine xmlns:a14="http://schemas.microsoft.com/office/drawing/2010/main" xmlns="" w="9525">
                     <a:solidFill>
                       <a:srgbClr val="000000"/>
                     </a:solidFill>
@@ -11608,7 +11608,7 @@
               </a:ln>
               <a:extLst>
                 <a:ext uri="{91240B29-F687-4f45-9708-019B960494DF}">
-                  <a14:hiddenLine xmlns="" xmlns:a14="http://schemas.microsoft.com/office/drawing/2010/main" w="9525">
+                  <a14:hiddenLine xmlns:a14="http://schemas.microsoft.com/office/drawing/2010/main" xmlns="" w="9525">
                     <a:solidFill>
                       <a:srgbClr val="000000"/>
                     </a:solidFill>
@@ -11676,7 +11676,7 @@
               </a:ln>
               <a:extLst>
                 <a:ext uri="{91240B29-F687-4f45-9708-019B960494DF}">
-                  <a14:hiddenLine xmlns="" xmlns:a14="http://schemas.microsoft.com/office/drawing/2010/main" w="9525">
+                  <a14:hiddenLine xmlns:a14="http://schemas.microsoft.com/office/drawing/2010/main" xmlns="" w="9525">
                     <a:solidFill>
                       <a:srgbClr val="000000"/>
                     </a:solidFill>
@@ -11766,7 +11766,7 @@
               </a:ln>
               <a:extLst>
                 <a:ext uri="{91240B29-F687-4f45-9708-019B960494DF}">
-                  <a14:hiddenLine xmlns="" xmlns:a14="http://schemas.microsoft.com/office/drawing/2010/main" w="9525">
+                  <a14:hiddenLine xmlns:a14="http://schemas.microsoft.com/office/drawing/2010/main" xmlns="" w="9525">
                     <a:solidFill>
                       <a:srgbClr val="000000"/>
                     </a:solidFill>
@@ -11800,7 +11800,7 @@
               </a:ln>
               <a:extLst>
                 <a:ext uri="{91240B29-F687-4f45-9708-019B960494DF}">
-                  <a14:hiddenLine xmlns="" xmlns:a14="http://schemas.microsoft.com/office/drawing/2010/main" w="9525">
+                  <a14:hiddenLine xmlns:a14="http://schemas.microsoft.com/office/drawing/2010/main" xmlns="" w="9525">
                     <a:solidFill>
                       <a:srgbClr val="000000"/>
                     </a:solidFill>

</xml_diff>